<commit_message>
simplify: Show raw LaTeX text instead of rendered equations
- Simplified math renderer to display raw LaTeX text directly
- Removed complex fallback boxes, now shows clean LaTeX expressions
- Updated CSS to style math text with monospace font and color
- Added actual math examples to demo content
- Math expressions like $E=mc^2$ now display as: E=mc^2
- Display math $$...$$ shows the raw LaTeX content

This provides the simplest approach: users see exactly what they typed
without any KaTeX dependencies or complex fallback styling.
</commit_message>
<xml_diff>
--- a/examples/output/notebook_example_dark.pptx
+++ b/examples/output/notebook_example_dark.pptx
@@ -4770,7 +4770,7 @@
       </p:sp>
       <p:pic>
         <p:nvPicPr>
-          <p:cNvPr id="4" name="Picture 3" descr="slide_41289bc7_create_growth_trend.png"/>
+          <p:cNvPr id="4" name="Picture 3" descr="slide_27b543ea_create_growth_trend.png"/>
           <p:cNvPicPr>
             <a:picLocks noChangeAspect="1"/>
           </p:cNvPicPr>
@@ -5191,7 +5191,7 @@
       </p:sp>
       <p:pic>
         <p:nvPicPr>
-          <p:cNvPr id="4" name="Picture 3" descr="slide_8742a85f_create_sales_chart.png"/>
+          <p:cNvPr id="4" name="Picture 3" descr="slide_89f29345_create_sales_chart.png"/>
           <p:cNvPicPr>
             <a:picLocks noChangeAspect="1"/>
           </p:cNvPicPr>
@@ -7954,7 +7954,7 @@
       </p:sp>
       <p:pic>
         <p:nvPicPr>
-          <p:cNvPr id="4" name="Picture 3" descr="slide_8742a85f_create_sales_chart.png"/>
+          <p:cNvPr id="4" name="Picture 3" descr="slide_89f29345_create_sales_chart.png"/>
           <p:cNvPicPr>
             <a:picLocks noChangeAspect="1"/>
           </p:cNvPicPr>
@@ -8295,7 +8295,7 @@
       </p:sp>
       <p:pic>
         <p:nvPicPr>
-          <p:cNvPr id="4" name="Picture 3" descr="slide_fb67b5a0_create_market_share.png"/>
+          <p:cNvPr id="4" name="Picture 3" descr="slide_efe173e6_create_market_share.png"/>
           <p:cNvPicPr>
             <a:picLocks noChangeAspect="1"/>
           </p:cNvPicPr>

</xml_diff>